<commit_message>
docs/DeveloperGuide: update diagrams (#247)
Let's update the diagrams to reflect the latest changes
</commit_message>
<xml_diff>
--- a/docs/diagrams/UndoRedoActivityDiagram.pptx
+++ b/docs/diagrams/UndoRedoActivityDiagram.pptx
@@ -261,7 +261,7 @@
           <a:p>
             <a:fld id="{542F47FF-5056-41FF-A1F8-23A414798AA4}" type="datetimeFigureOut">
               <a:rPr lang="en-SG" smtClean="0"/>
-              <a:t>26 Feb 2019</a:t>
+              <a:t>15/4/19</a:t>
             </a:fld>
             <a:endParaRPr lang="en-SG"/>
           </a:p>
@@ -461,7 +461,7 @@
           <a:p>
             <a:fld id="{542F47FF-5056-41FF-A1F8-23A414798AA4}" type="datetimeFigureOut">
               <a:rPr lang="en-SG" smtClean="0"/>
-              <a:t>26 Feb 2019</a:t>
+              <a:t>15/4/19</a:t>
             </a:fld>
             <a:endParaRPr lang="en-SG"/>
           </a:p>
@@ -671,7 +671,7 @@
           <a:p>
             <a:fld id="{542F47FF-5056-41FF-A1F8-23A414798AA4}" type="datetimeFigureOut">
               <a:rPr lang="en-SG" smtClean="0"/>
-              <a:t>26 Feb 2019</a:t>
+              <a:t>15/4/19</a:t>
             </a:fld>
             <a:endParaRPr lang="en-SG"/>
           </a:p>
@@ -871,7 +871,7 @@
           <a:p>
             <a:fld id="{542F47FF-5056-41FF-A1F8-23A414798AA4}" type="datetimeFigureOut">
               <a:rPr lang="en-SG" smtClean="0"/>
-              <a:t>26 Feb 2019</a:t>
+              <a:t>15/4/19</a:t>
             </a:fld>
             <a:endParaRPr lang="en-SG"/>
           </a:p>
@@ -1147,7 +1147,7 @@
           <a:p>
             <a:fld id="{542F47FF-5056-41FF-A1F8-23A414798AA4}" type="datetimeFigureOut">
               <a:rPr lang="en-SG" smtClean="0"/>
-              <a:t>26 Feb 2019</a:t>
+              <a:t>15/4/19</a:t>
             </a:fld>
             <a:endParaRPr lang="en-SG"/>
           </a:p>
@@ -1415,7 +1415,7 @@
           <a:p>
             <a:fld id="{542F47FF-5056-41FF-A1F8-23A414798AA4}" type="datetimeFigureOut">
               <a:rPr lang="en-SG" smtClean="0"/>
-              <a:t>26 Feb 2019</a:t>
+              <a:t>15/4/19</a:t>
             </a:fld>
             <a:endParaRPr lang="en-SG"/>
           </a:p>
@@ -1830,7 +1830,7 @@
           <a:p>
             <a:fld id="{542F47FF-5056-41FF-A1F8-23A414798AA4}" type="datetimeFigureOut">
               <a:rPr lang="en-SG" smtClean="0"/>
-              <a:t>26 Feb 2019</a:t>
+              <a:t>15/4/19</a:t>
             </a:fld>
             <a:endParaRPr lang="en-SG"/>
           </a:p>
@@ -1972,7 +1972,7 @@
           <a:p>
             <a:fld id="{542F47FF-5056-41FF-A1F8-23A414798AA4}" type="datetimeFigureOut">
               <a:rPr lang="en-SG" smtClean="0"/>
-              <a:t>26 Feb 2019</a:t>
+              <a:t>15/4/19</a:t>
             </a:fld>
             <a:endParaRPr lang="en-SG"/>
           </a:p>
@@ -2085,7 +2085,7 @@
           <a:p>
             <a:fld id="{542F47FF-5056-41FF-A1F8-23A414798AA4}" type="datetimeFigureOut">
               <a:rPr lang="en-SG" smtClean="0"/>
-              <a:t>26 Feb 2019</a:t>
+              <a:t>15/4/19</a:t>
             </a:fld>
             <a:endParaRPr lang="en-SG"/>
           </a:p>
@@ -2398,7 +2398,7 @@
           <a:p>
             <a:fld id="{542F47FF-5056-41FF-A1F8-23A414798AA4}" type="datetimeFigureOut">
               <a:rPr lang="en-SG" smtClean="0"/>
-              <a:t>26 Feb 2019</a:t>
+              <a:t>15/4/19</a:t>
             </a:fld>
             <a:endParaRPr lang="en-SG"/>
           </a:p>
@@ -2687,7 +2687,7 @@
           <a:p>
             <a:fld id="{542F47FF-5056-41FF-A1F8-23A414798AA4}" type="datetimeFigureOut">
               <a:rPr lang="en-SG" smtClean="0"/>
-              <a:t>26 Feb 2019</a:t>
+              <a:t>15/4/19</a:t>
             </a:fld>
             <a:endParaRPr lang="en-SG"/>
           </a:p>
@@ -2930,7 +2930,7 @@
           <a:p>
             <a:fld id="{542F47FF-5056-41FF-A1F8-23A414798AA4}" type="datetimeFigureOut">
               <a:rPr lang="en-SG" smtClean="0"/>
-              <a:t>26 Feb 2019</a:t>
+              <a:t>15/4/19</a:t>
             </a:fld>
             <a:endParaRPr lang="en-SG"/>
           </a:p>
@@ -3672,7 +3672,7 @@
               </a:r>
               <a:r>
                 <a:rPr lang="en-US" dirty="0"/>
-                <a:t>command commits address book]</a:t>
+                <a:t>command commits application]</a:t>
               </a:r>
               <a:endParaRPr lang="en-SG" sz="1801" dirty="0"/>
             </a:p>
@@ -3725,11 +3725,23 @@
               <a:pPr algn="ctr"/>
               <a:r>
                 <a:rPr lang="en-SG" sz="1801" dirty="0"/>
-                <a:t>Purge redundant states and then save address book to </a:t>
+                <a:t>Purge redundant states and then save </a:t>
+              </a:r>
+              <a:r>
+                <a:rPr lang="en-US" dirty="0"/>
+                <a:t>application  </a:t>
+              </a:r>
+              <a:r>
+                <a:rPr lang="en-SG" sz="1801" dirty="0"/>
+                <a:t>to </a:t>
+              </a:r>
+              <a:r>
+                <a:rPr lang="en-US" dirty="0"/>
+                <a:t>application</a:t>
               </a:r>
               <a:r>
                 <a:rPr lang="en-SG" sz="1801" dirty="0" err="1"/>
-                <a:t>addressBookStateList</a:t>
+                <a:t>StateList</a:t>
               </a:r>
               <a:r>
                 <a:rPr lang="en-SG" sz="1801" dirty="0"/>

</xml_diff>